<commit_message>
Lk remove zarr readme (#350)
Updated Optimus documentation for Zarr removal
</commit_message>
<xml_diff>
--- a/pipelines/optimus/Optimus_diagram.pptx
+++ b/pipelines/optimus/Optimus_diagram.pptx
@@ -107,6 +107,11 @@
       </a:defRPr>
     </a:lvl9pPr>
   </p:defaultTextStyle>
+  <p:extLst>
+    <p:ext uri="{EFAFB233-063F-42B5-8137-9DF3F51BA10A}">
+      <p15:sldGuideLst xmlns:p15="http://schemas.microsoft.com/office/powerpoint/2012/main"/>
+    </p:ext>
+  </p:extLst>
 </p:presentation>
 </file>
 
@@ -192,7 +197,7 @@
           <a:p>
             <a:fld id="{3B247612-FC5A-7843-B5B2-FA2E1D48714B}" type="datetimeFigureOut">
               <a:rPr lang="en-US" smtClean="0"/>
-              <a:t>4/7/20</a:t>
+              <a:t>6/3/20</a:t>
             </a:fld>
             <a:endParaRPr lang="en-US"/>
           </a:p>
@@ -488,8 +493,8 @@
         </p:nvSpPr>
         <p:spPr>
           <a:xfrm>
-            <a:off x="384175" y="685800"/>
-            <a:ext cx="6089650" cy="3429000"/>
+            <a:off x="381000" y="685800"/>
+            <a:ext cx="6096000" cy="3429000"/>
           </a:xfrm>
           <a:custGeom>
             <a:avLst/>
@@ -751,7 +756,7 @@
           <a:p>
             <a:fld id="{786A7BB3-3C1F-0349-BAD5-145FD03E8E0E}" type="datetimeFigureOut">
               <a:rPr lang="en-US" smtClean="0"/>
-              <a:t>4/7/20</a:t>
+              <a:t>6/3/20</a:t>
             </a:fld>
             <a:endParaRPr lang="en-US"/>
           </a:p>
@@ -949,7 +954,7 @@
           <a:p>
             <a:fld id="{786A7BB3-3C1F-0349-BAD5-145FD03E8E0E}" type="datetimeFigureOut">
               <a:rPr lang="en-US" smtClean="0"/>
-              <a:t>4/7/20</a:t>
+              <a:t>6/3/20</a:t>
             </a:fld>
             <a:endParaRPr lang="en-US"/>
           </a:p>
@@ -1157,7 +1162,7 @@
           <a:p>
             <a:fld id="{786A7BB3-3C1F-0349-BAD5-145FD03E8E0E}" type="datetimeFigureOut">
               <a:rPr lang="en-US" smtClean="0"/>
-              <a:t>4/7/20</a:t>
+              <a:t>6/3/20</a:t>
             </a:fld>
             <a:endParaRPr lang="en-US"/>
           </a:p>
@@ -1355,7 +1360,7 @@
           <a:p>
             <a:fld id="{786A7BB3-3C1F-0349-BAD5-145FD03E8E0E}" type="datetimeFigureOut">
               <a:rPr lang="en-US" smtClean="0"/>
-              <a:t>4/7/20</a:t>
+              <a:t>6/3/20</a:t>
             </a:fld>
             <a:endParaRPr lang="en-US"/>
           </a:p>
@@ -1630,7 +1635,7 @@
           <a:p>
             <a:fld id="{786A7BB3-3C1F-0349-BAD5-145FD03E8E0E}" type="datetimeFigureOut">
               <a:rPr lang="en-US" smtClean="0"/>
-              <a:t>4/7/20</a:t>
+              <a:t>6/3/20</a:t>
             </a:fld>
             <a:endParaRPr lang="en-US"/>
           </a:p>
@@ -1895,7 +1900,7 @@
           <a:p>
             <a:fld id="{786A7BB3-3C1F-0349-BAD5-145FD03E8E0E}" type="datetimeFigureOut">
               <a:rPr lang="en-US" smtClean="0"/>
-              <a:t>4/7/20</a:t>
+              <a:t>6/3/20</a:t>
             </a:fld>
             <a:endParaRPr lang="en-US"/>
           </a:p>
@@ -2307,7 +2312,7 @@
           <a:p>
             <a:fld id="{786A7BB3-3C1F-0349-BAD5-145FD03E8E0E}" type="datetimeFigureOut">
               <a:rPr lang="en-US" smtClean="0"/>
-              <a:t>4/7/20</a:t>
+              <a:t>6/3/20</a:t>
             </a:fld>
             <a:endParaRPr lang="en-US"/>
           </a:p>
@@ -2448,7 +2453,7 @@
           <a:p>
             <a:fld id="{786A7BB3-3C1F-0349-BAD5-145FD03E8E0E}" type="datetimeFigureOut">
               <a:rPr lang="en-US" smtClean="0"/>
-              <a:t>4/7/20</a:t>
+              <a:t>6/3/20</a:t>
             </a:fld>
             <a:endParaRPr lang="en-US"/>
           </a:p>
@@ -2561,7 +2566,7 @@
           <a:p>
             <a:fld id="{786A7BB3-3C1F-0349-BAD5-145FD03E8E0E}" type="datetimeFigureOut">
               <a:rPr lang="en-US" smtClean="0"/>
-              <a:t>4/7/20</a:t>
+              <a:t>6/3/20</a:t>
             </a:fld>
             <a:endParaRPr lang="en-US"/>
           </a:p>
@@ -2872,7 +2877,7 @@
           <a:p>
             <a:fld id="{786A7BB3-3C1F-0349-BAD5-145FD03E8E0E}" type="datetimeFigureOut">
               <a:rPr lang="en-US" smtClean="0"/>
-              <a:t>4/7/20</a:t>
+              <a:t>6/3/20</a:t>
             </a:fld>
             <a:endParaRPr lang="en-US"/>
           </a:p>
@@ -3160,7 +3165,7 @@
           <a:p>
             <a:fld id="{786A7BB3-3C1F-0349-BAD5-145FD03E8E0E}" type="datetimeFigureOut">
               <a:rPr lang="en-US" smtClean="0"/>
-              <a:t>4/7/20</a:t>
+              <a:t>6/3/20</a:t>
             </a:fld>
             <a:endParaRPr lang="en-US"/>
           </a:p>
@@ -3401,7 +3406,7 @@
           <a:p>
             <a:fld id="{786A7BB3-3C1F-0349-BAD5-145FD03E8E0E}" type="datetimeFigureOut">
               <a:rPr lang="en-US" smtClean="0"/>
-              <a:t>4/7/20</a:t>
+              <a:t>6/3/20</a:t>
             </a:fld>
             <a:endParaRPr lang="en-US"/>
           </a:p>
@@ -3832,10 +3837,10 @@
         </p:nvGrpSpPr>
         <p:grpSpPr>
           <a:xfrm>
-            <a:off x="229745" y="1796271"/>
-            <a:ext cx="8341481" cy="3484612"/>
+            <a:off x="229744" y="1796271"/>
+            <a:ext cx="9009505" cy="3484612"/>
             <a:chOff x="196770" y="2696901"/>
-            <a:chExt cx="12523807" cy="5231757"/>
+            <a:chExt cx="12676074" cy="5231757"/>
           </a:xfrm>
         </p:grpSpPr>
         <p:grpSp>
@@ -3853,9 +3858,9 @@
           <p:grpSpPr>
             <a:xfrm>
               <a:off x="288408" y="2786954"/>
-              <a:ext cx="12317980" cy="5055762"/>
+              <a:ext cx="12584436" cy="5055762"/>
               <a:chOff x="288408" y="2786954"/>
-              <a:chExt cx="12317980" cy="5055762"/>
+              <a:chExt cx="12584436" cy="5055762"/>
             </a:xfrm>
           </p:grpSpPr>
           <p:sp>
@@ -4732,7 +4737,7 @@
             </p:nvSpPr>
             <p:spPr>
               <a:xfrm>
-                <a:off x="10615381" y="3639708"/>
+                <a:off x="10881837" y="3843750"/>
                 <a:ext cx="1991007" cy="420000"/>
               </a:xfrm>
               <a:prstGeom prst="rect">
@@ -4755,7 +4760,7 @@
               <a:p>
                 <a:r>
                   <a:rPr lang="en" sz="799" b="1" dirty="0" err="1"/>
-                  <a:t>OptimusZarrConversion</a:t>
+                  <a:t>OptimusLoomGeneration</a:t>
                 </a:r>
                 <a:endParaRPr sz="799" b="1" dirty="0"/>
               </a:p>
@@ -5186,56 +5191,6 @@
           </p:sp>
           <p:sp>
             <p:nvSpPr>
-              <p:cNvPr id="122" name="Google Shape;92;p13">
-                <a:extLst>
-                  <a:ext uri="{FF2B5EF4-FFF2-40B4-BE49-F238E27FC236}">
-                    <a16:creationId xmlns:a16="http://schemas.microsoft.com/office/drawing/2014/main" id="{723E3E73-5C94-9741-8026-78F0D5713C48}"/>
-                  </a:ext>
-                </a:extLst>
-              </p:cNvPr>
-              <p:cNvSpPr txBox="1"/>
-              <p:nvPr/>
-            </p:nvSpPr>
-            <p:spPr>
-              <a:xfrm>
-                <a:off x="10615380" y="4468012"/>
-                <a:ext cx="1856821" cy="519323"/>
-              </a:xfrm>
-              <a:prstGeom prst="rect">
-                <a:avLst/>
-              </a:prstGeom>
-              <a:solidFill>
-                <a:srgbClr val="E69138"/>
-              </a:solidFill>
-              <a:ln>
-                <a:solidFill>
-                  <a:schemeClr val="tx1"/>
-                </a:solidFill>
-              </a:ln>
-            </p:spPr>
-            <p:txBody>
-              <a:bodyPr spcFirstLastPara="1" wrap="square" lIns="60894" tIns="60894" rIns="60894" bIns="60894" anchor="t" anchorCtr="0">
-                <a:noAutofit/>
-              </a:bodyPr>
-              <a:lstStyle/>
-              <a:p>
-                <a:r>
-                  <a:rPr lang="en" sz="799" b="1" dirty="0" err="1"/>
-                  <a:t>OptimusZarrToLoom</a:t>
-                </a:r>
-                <a:endParaRPr lang="en" sz="799" b="1" dirty="0"/>
-              </a:p>
-              <a:p>
-                <a:r>
-                  <a:rPr lang="en" sz="799" b="1" dirty="0"/>
-                  <a:t>(optional)</a:t>
-                </a:r>
-                <a:endParaRPr sz="799" b="1" dirty="0"/>
-              </a:p>
-            </p:txBody>
-          </p:sp>
-          <p:sp>
-            <p:nvSpPr>
               <p:cNvPr id="123" name="Google Shape;92;p13">
                 <a:extLst>
                   <a:ext uri="{FF2B5EF4-FFF2-40B4-BE49-F238E27FC236}">
@@ -5331,8 +5286,8 @@
             </p:nvCxnSpPr>
             <p:spPr>
               <a:xfrm flipV="1">
-                <a:off x="10369967" y="3849708"/>
-                <a:ext cx="245414" cy="1425736"/>
+                <a:off x="10369968" y="4053751"/>
+                <a:ext cx="511868" cy="1221695"/>
               </a:xfrm>
               <a:prstGeom prst="straightConnector1">
                 <a:avLst/>
@@ -5367,8 +5322,8 @@
             </p:nvCxnSpPr>
             <p:spPr>
               <a:xfrm flipV="1">
-                <a:off x="10188969" y="3849708"/>
-                <a:ext cx="426412" cy="635319"/>
+                <a:off x="10188969" y="4053751"/>
+                <a:ext cx="692867" cy="431277"/>
               </a:xfrm>
               <a:prstGeom prst="straightConnector1">
                 <a:avLst/>
@@ -5403,8 +5358,8 @@
             </p:nvCxnSpPr>
             <p:spPr>
               <a:xfrm>
-                <a:off x="10188969" y="3849708"/>
-                <a:ext cx="426412" cy="0"/>
+                <a:off x="10188969" y="3849709"/>
+                <a:ext cx="692867" cy="204042"/>
               </a:xfrm>
               <a:prstGeom prst="straightConnector1">
                 <a:avLst/>
@@ -5439,43 +5394,8 @@
             </p:nvCxnSpPr>
             <p:spPr>
               <a:xfrm>
-                <a:off x="10192623" y="3220310"/>
-                <a:ext cx="422758" cy="629398"/>
-              </a:xfrm>
-              <a:prstGeom prst="straightConnector1">
-                <a:avLst/>
-              </a:prstGeom>
-              <a:noFill/>
-              <a:ln w="9525" cap="flat" cmpd="sng">
-                <a:solidFill>
-                  <a:schemeClr val="dk2"/>
-                </a:solidFill>
-                <a:prstDash val="solid"/>
-                <a:round/>
-                <a:headEnd type="none" w="med" len="med"/>
-                <a:tailEnd type="triangle" w="med" len="med"/>
-              </a:ln>
-            </p:spPr>
-          </p:cxnSp>
-          <p:cxnSp>
-            <p:nvCxnSpPr>
-              <p:cNvPr id="138" name="Google Shape;91;p13">
-                <a:extLst>
-                  <a:ext uri="{FF2B5EF4-FFF2-40B4-BE49-F238E27FC236}">
-                    <a16:creationId xmlns:a16="http://schemas.microsoft.com/office/drawing/2014/main" id="{9DCEBDDE-54F8-0644-A803-A0D946532BDA}"/>
-                  </a:ext>
-                </a:extLst>
-              </p:cNvPr>
-              <p:cNvCxnSpPr>
-                <a:cxnSpLocks/>
-                <a:endCxn id="122" idx="0"/>
-              </p:cNvCxnSpPr>
-              <p:nvPr/>
-            </p:nvCxnSpPr>
-            <p:spPr>
-              <a:xfrm>
-                <a:off x="11543647" y="4047659"/>
-                <a:ext cx="144" cy="420353"/>
+                <a:off x="10192624" y="3220309"/>
+                <a:ext cx="689213" cy="833442"/>
               </a:xfrm>
               <a:prstGeom prst="straightConnector1">
                 <a:avLst/>

</xml_diff>